<commit_message>
Cleaned and Filtered Dataset and Added stuff to slides
</commit_message>
<xml_diff>
--- a/DDI Midterm.pptx
+++ b/DDI Midterm.pptx
@@ -6,6 +6,9 @@
   </p:sldMasterIdLst>
   <p:sldIdLst>
     <p:sldId id="256" r:id="rId2"/>
+    <p:sldId id="258" r:id="rId3"/>
+    <p:sldId id="259" r:id="rId4"/>
+    <p:sldId id="260" r:id="rId5"/>
   </p:sldIdLst>
   <p:sldSz cx="12192000" cy="6858000"/>
   <p:notesSz cx="6858000" cy="9144000"/>
@@ -104,6 +107,11 @@
       </a:defRPr>
     </a:lvl9pPr>
   </p:defaultTextStyle>
+  <p:extLst>
+    <p:ext uri="{EFAFB233-063F-42B5-8137-9DF3F51BA10A}">
+      <p15:sldGuideLst xmlns:p15="http://schemas.microsoft.com/office/powerpoint/2012/main"/>
+    </p:ext>
+  </p:extLst>
 </p:presentation>
 </file>
 
@@ -3375,6 +3383,395 @@
     <p:extLst>
       <p:ext uri="{BB962C8B-B14F-4D97-AF65-F5344CB8AC3E}">
         <p14:creationId xmlns:p14="http://schemas.microsoft.com/office/powerpoint/2010/main" val="3281050900"/>
+      </p:ext>
+    </p:extLst>
+  </p:cSld>
+  <p:clrMapOvr>
+    <a:masterClrMapping/>
+  </p:clrMapOvr>
+</p:sld>
+</file>
+
+<file path=ppt/slides/slide2.xml><?xml version="1.0" encoding="utf-8"?>
+<p:sld xmlns:a="http://schemas.openxmlformats.org/drawingml/2006/main" xmlns:r="http://schemas.openxmlformats.org/officeDocument/2006/relationships" xmlns:p="http://schemas.openxmlformats.org/presentationml/2006/main">
+  <p:cSld>
+    <p:spTree>
+      <p:nvGrpSpPr>
+        <p:cNvPr id="1" name=""/>
+        <p:cNvGrpSpPr/>
+        <p:nvPr/>
+      </p:nvGrpSpPr>
+      <p:grpSpPr>
+        <a:xfrm>
+          <a:off x="0" y="0"/>
+          <a:ext cx="0" cy="0"/>
+          <a:chOff x="0" y="0"/>
+          <a:chExt cx="0" cy="0"/>
+        </a:xfrm>
+      </p:grpSpPr>
+      <p:sp>
+        <p:nvSpPr>
+          <p:cNvPr id="2" name="Title 1">
+            <a:extLst>
+              <a:ext uri="{FF2B5EF4-FFF2-40B4-BE49-F238E27FC236}">
+                <a16:creationId xmlns:a16="http://schemas.microsoft.com/office/drawing/2014/main" id="{AE1CE15D-F6F1-C87A-ABF4-00F16BB00489}"/>
+              </a:ext>
+            </a:extLst>
+          </p:cNvPr>
+          <p:cNvSpPr>
+            <a:spLocks noGrp="1"/>
+          </p:cNvSpPr>
+          <p:nvPr>
+            <p:ph type="title"/>
+          </p:nvPr>
+        </p:nvSpPr>
+        <p:spPr/>
+        <p:txBody>
+          <a:bodyPr/>
+          <a:lstStyle/>
+          <a:p>
+            <a:r>
+              <a:rPr lang="en-US" dirty="0"/>
+              <a:t>Research Question/Objective</a:t>
+            </a:r>
+          </a:p>
+        </p:txBody>
+      </p:sp>
+      <p:sp>
+        <p:nvSpPr>
+          <p:cNvPr id="3" name="Content Placeholder 2">
+            <a:extLst>
+              <a:ext uri="{FF2B5EF4-FFF2-40B4-BE49-F238E27FC236}">
+                <a16:creationId xmlns:a16="http://schemas.microsoft.com/office/drawing/2014/main" id="{92E892F6-BFFD-788E-0B5E-D7C92E32D165}"/>
+              </a:ext>
+            </a:extLst>
+          </p:cNvPr>
+          <p:cNvSpPr>
+            <a:spLocks noGrp="1"/>
+          </p:cNvSpPr>
+          <p:nvPr>
+            <p:ph idx="1"/>
+          </p:nvPr>
+        </p:nvSpPr>
+        <p:spPr/>
+        <p:txBody>
+          <a:bodyPr/>
+          <a:lstStyle/>
+          <a:p>
+            <a:r>
+              <a:rPr lang="en-US" dirty="0">
+                <a:solidFill>
+                  <a:srgbClr val="C00000"/>
+                </a:solidFill>
+              </a:rPr>
+              <a:t>Why I Chose This Topic (Background)</a:t>
+            </a:r>
+          </a:p>
+          <a:p>
+            <a:r>
+              <a:rPr lang="en-US" dirty="0">
+                <a:solidFill>
+                  <a:srgbClr val="C00000"/>
+                </a:solidFill>
+              </a:rPr>
+              <a:t>How it Addresses a Specific Problem or Question</a:t>
+            </a:r>
+          </a:p>
+        </p:txBody>
+      </p:sp>
+    </p:spTree>
+    <p:extLst>
+      <p:ext uri="{BB962C8B-B14F-4D97-AF65-F5344CB8AC3E}">
+        <p14:creationId xmlns:p14="http://schemas.microsoft.com/office/powerpoint/2010/main" val="3825188763"/>
+      </p:ext>
+    </p:extLst>
+  </p:cSld>
+  <p:clrMapOvr>
+    <a:masterClrMapping/>
+  </p:clrMapOvr>
+</p:sld>
+</file>
+
+<file path=ppt/slides/slide3.xml><?xml version="1.0" encoding="utf-8"?>
+<p:sld xmlns:a="http://schemas.openxmlformats.org/drawingml/2006/main" xmlns:r="http://schemas.openxmlformats.org/officeDocument/2006/relationships" xmlns:p="http://schemas.openxmlformats.org/presentationml/2006/main">
+  <p:cSld>
+    <p:spTree>
+      <p:nvGrpSpPr>
+        <p:cNvPr id="1" name=""/>
+        <p:cNvGrpSpPr/>
+        <p:nvPr/>
+      </p:nvGrpSpPr>
+      <p:grpSpPr>
+        <a:xfrm>
+          <a:off x="0" y="0"/>
+          <a:ext cx="0" cy="0"/>
+          <a:chOff x="0" y="0"/>
+          <a:chExt cx="0" cy="0"/>
+        </a:xfrm>
+      </p:grpSpPr>
+      <p:sp>
+        <p:nvSpPr>
+          <p:cNvPr id="2" name="Title 1">
+            <a:extLst>
+              <a:ext uri="{FF2B5EF4-FFF2-40B4-BE49-F238E27FC236}">
+                <a16:creationId xmlns:a16="http://schemas.microsoft.com/office/drawing/2014/main" id="{447C6E3B-A332-2E1C-73D1-B2D183992075}"/>
+              </a:ext>
+            </a:extLst>
+          </p:cNvPr>
+          <p:cNvSpPr>
+            <a:spLocks noGrp="1"/>
+          </p:cNvSpPr>
+          <p:nvPr>
+            <p:ph type="title"/>
+          </p:nvPr>
+        </p:nvSpPr>
+        <p:spPr/>
+        <p:txBody>
+          <a:bodyPr/>
+          <a:lstStyle/>
+          <a:p>
+            <a:r>
+              <a:rPr lang="en-US" dirty="0"/>
+              <a:t>Data Sources &amp; Transformations</a:t>
+            </a:r>
+          </a:p>
+        </p:txBody>
+      </p:sp>
+      <p:sp>
+        <p:nvSpPr>
+          <p:cNvPr id="3" name="Content Placeholder 2">
+            <a:extLst>
+              <a:ext uri="{FF2B5EF4-FFF2-40B4-BE49-F238E27FC236}">
+                <a16:creationId xmlns:a16="http://schemas.microsoft.com/office/drawing/2014/main" id="{232B29B0-38C7-5BD1-91CB-69E9BAEB3D34}"/>
+              </a:ext>
+            </a:extLst>
+          </p:cNvPr>
+          <p:cNvSpPr>
+            <a:spLocks noGrp="1"/>
+          </p:cNvSpPr>
+          <p:nvPr>
+            <p:ph idx="1"/>
+          </p:nvPr>
+        </p:nvSpPr>
+        <p:spPr/>
+        <p:txBody>
+          <a:bodyPr/>
+          <a:lstStyle/>
+          <a:p>
+            <a:r>
+              <a:rPr lang="en-US" dirty="0">
+                <a:solidFill>
+                  <a:srgbClr val="C00000"/>
+                </a:solidFill>
+              </a:rPr>
+              <a:t>Where Data Comes From, Reliability, Limitations</a:t>
+            </a:r>
+          </a:p>
+          <a:p>
+            <a:r>
+              <a:rPr lang="en-US" dirty="0">
+                <a:solidFill>
+                  <a:srgbClr val="C00000"/>
+                </a:solidFill>
+              </a:rPr>
+              <a:t>Summarize Cleaning and Transformation Steps in Non-Technical Way</a:t>
+            </a:r>
+          </a:p>
+        </p:txBody>
+      </p:sp>
+    </p:spTree>
+    <p:extLst>
+      <p:ext uri="{BB962C8B-B14F-4D97-AF65-F5344CB8AC3E}">
+        <p14:creationId xmlns:p14="http://schemas.microsoft.com/office/powerpoint/2010/main" val="828992668"/>
+      </p:ext>
+    </p:extLst>
+  </p:cSld>
+  <p:clrMapOvr>
+    <a:masterClrMapping/>
+  </p:clrMapOvr>
+</p:sld>
+</file>
+
+<file path=ppt/slides/slide4.xml><?xml version="1.0" encoding="utf-8"?>
+<p:sld xmlns:a="http://schemas.openxmlformats.org/drawingml/2006/main" xmlns:r="http://schemas.openxmlformats.org/officeDocument/2006/relationships" xmlns:p="http://schemas.openxmlformats.org/presentationml/2006/main">
+  <p:cSld>
+    <p:spTree>
+      <p:nvGrpSpPr>
+        <p:cNvPr id="1" name=""/>
+        <p:cNvGrpSpPr/>
+        <p:nvPr/>
+      </p:nvGrpSpPr>
+      <p:grpSpPr>
+        <a:xfrm>
+          <a:off x="0" y="0"/>
+          <a:ext cx="0" cy="0"/>
+          <a:chOff x="0" y="0"/>
+          <a:chExt cx="0" cy="0"/>
+        </a:xfrm>
+      </p:grpSpPr>
+      <p:sp>
+        <p:nvSpPr>
+          <p:cNvPr id="2" name="Title 1">
+            <a:extLst>
+              <a:ext uri="{FF2B5EF4-FFF2-40B4-BE49-F238E27FC236}">
+                <a16:creationId xmlns:a16="http://schemas.microsoft.com/office/drawing/2014/main" id="{AAB09D2A-06B1-035C-511F-E162761657CA}"/>
+              </a:ext>
+            </a:extLst>
+          </p:cNvPr>
+          <p:cNvSpPr>
+            <a:spLocks noGrp="1"/>
+          </p:cNvSpPr>
+          <p:nvPr>
+            <p:ph type="title"/>
+          </p:nvPr>
+        </p:nvSpPr>
+        <p:spPr/>
+        <p:txBody>
+          <a:bodyPr/>
+          <a:lstStyle/>
+          <a:p>
+            <a:r>
+              <a:rPr lang="en-US" dirty="0"/>
+              <a:t>Contextual Visualizations</a:t>
+            </a:r>
+          </a:p>
+        </p:txBody>
+      </p:sp>
+      <p:sp>
+        <p:nvSpPr>
+          <p:cNvPr id="3" name="Content Placeholder 2">
+            <a:extLst>
+              <a:ext uri="{FF2B5EF4-FFF2-40B4-BE49-F238E27FC236}">
+                <a16:creationId xmlns:a16="http://schemas.microsoft.com/office/drawing/2014/main" id="{663B2850-7C0F-8AF3-99A4-F701DED68006}"/>
+              </a:ext>
+            </a:extLst>
+          </p:cNvPr>
+          <p:cNvSpPr>
+            <a:spLocks noGrp="1"/>
+          </p:cNvSpPr>
+          <p:nvPr>
+            <p:ph idx="1"/>
+          </p:nvPr>
+        </p:nvSpPr>
+        <p:spPr/>
+        <p:txBody>
+          <a:bodyPr>
+            <a:normAutofit lnSpcReduction="10000"/>
+          </a:bodyPr>
+          <a:lstStyle/>
+          <a:p>
+            <a:r>
+              <a:rPr lang="en-US" dirty="0">
+                <a:solidFill>
+                  <a:srgbClr val="C00000"/>
+                </a:solidFill>
+              </a:rPr>
+              <a:t>Bar Chart (Satellite Missions by Frequency Band)</a:t>
+            </a:r>
+          </a:p>
+          <a:p>
+            <a:pPr lvl="1"/>
+            <a:r>
+              <a:rPr lang="en-US" dirty="0">
+                <a:solidFill>
+                  <a:srgbClr val="C00000"/>
+                </a:solidFill>
+              </a:rPr>
+              <a:t>X = Mission Purpose</a:t>
+            </a:r>
+          </a:p>
+          <a:p>
+            <a:pPr lvl="1"/>
+            <a:r>
+              <a:rPr lang="en-US" dirty="0">
+                <a:solidFill>
+                  <a:srgbClr val="C00000"/>
+                </a:solidFill>
+              </a:rPr>
+              <a:t>Y = Number of Satellites</a:t>
+            </a:r>
+          </a:p>
+          <a:p>
+            <a:r>
+              <a:rPr lang="en-US" dirty="0">
+                <a:solidFill>
+                  <a:srgbClr val="C00000"/>
+                </a:solidFill>
+              </a:rPr>
+              <a:t>Stacked Bar Chart  (Comparing Mission Types Across Multiple Bands)</a:t>
+            </a:r>
+          </a:p>
+          <a:p>
+            <a:pPr lvl="1"/>
+            <a:r>
+              <a:rPr lang="en-US" dirty="0">
+                <a:solidFill>
+                  <a:srgbClr val="C00000"/>
+                </a:solidFill>
+              </a:rPr>
+              <a:t>X = Mission Purpose</a:t>
+            </a:r>
+          </a:p>
+          <a:p>
+            <a:pPr lvl="1"/>
+            <a:r>
+              <a:rPr lang="en-US" dirty="0">
+                <a:solidFill>
+                  <a:srgbClr val="C00000"/>
+                </a:solidFill>
+              </a:rPr>
+              <a:t>Stacked = Frequency Bands</a:t>
+            </a:r>
+          </a:p>
+          <a:p>
+            <a:r>
+              <a:rPr lang="en-US" dirty="0">
+                <a:solidFill>
+                  <a:srgbClr val="C00000"/>
+                </a:solidFill>
+              </a:rPr>
+              <a:t>Heatmap (Correlations Between Mission Type and Orbit Type)</a:t>
+            </a:r>
+          </a:p>
+          <a:p>
+            <a:pPr lvl="1"/>
+            <a:r>
+              <a:rPr lang="en-US" dirty="0">
+                <a:solidFill>
+                  <a:srgbClr val="C00000"/>
+                </a:solidFill>
+              </a:rPr>
+              <a:t>Rows: Mission Purpose</a:t>
+            </a:r>
+          </a:p>
+          <a:p>
+            <a:pPr lvl="1"/>
+            <a:r>
+              <a:rPr lang="en-US" dirty="0">
+                <a:solidFill>
+                  <a:srgbClr val="C00000"/>
+                </a:solidFill>
+              </a:rPr>
+              <a:t>Columns: Orbit Type </a:t>
+            </a:r>
+          </a:p>
+          <a:p>
+            <a:pPr lvl="1"/>
+            <a:r>
+              <a:rPr lang="en-US" dirty="0">
+                <a:solidFill>
+                  <a:srgbClr val="C00000"/>
+                </a:solidFill>
+              </a:rPr>
+              <a:t>Color Intensity: Number of Satellites</a:t>
+            </a:r>
+          </a:p>
+        </p:txBody>
+      </p:sp>
+    </p:spTree>
+    <p:extLst>
+      <p:ext uri="{BB962C8B-B14F-4D97-AF65-F5344CB8AC3E}">
+        <p14:creationId xmlns:p14="http://schemas.microsoft.com/office/powerpoint/2010/main" val="1959501930"/>
       </p:ext>
     </p:extLst>
   </p:cSld>

</xml_diff>